<commit_message>
minor formatting changes for resources page
</commit_message>
<xml_diff>
--- a/figure.pptx
+++ b/figure.pptx
@@ -6,9 +6,10 @@
   </p:sldMasterIdLst>
   <p:sldIdLst>
     <p:sldId id="256" r:id="rId2"/>
-    <p:sldId id="258" r:id="rId3"/>
-    <p:sldId id="259" r:id="rId4"/>
-    <p:sldId id="257" r:id="rId5"/>
+    <p:sldId id="260" r:id="rId3"/>
+    <p:sldId id="258" r:id="rId4"/>
+    <p:sldId id="259" r:id="rId5"/>
+    <p:sldId id="257" r:id="rId6"/>
   </p:sldIdLst>
   <p:sldSz cx="12192000" cy="6858000"/>
   <p:notesSz cx="6858000" cy="9144000"/>
@@ -107,6 +108,11 @@
       </a:defRPr>
     </a:lvl9pPr>
   </p:defaultTextStyle>
+  <p:extLst>
+    <p:ext uri="{EFAFB233-063F-42B5-8137-9DF3F51BA10A}">
+      <p15:sldGuideLst xmlns:p15="http://schemas.microsoft.com/office/powerpoint/2012/main"/>
+    </p:ext>
+  </p:extLst>
 </p:presentation>
 </file>
 
@@ -259,7 +265,7 @@
           <a:p>
             <a:fld id="{752DA0A9-DB57-2042-B761-A7985756CD66}" type="datetimeFigureOut">
               <a:rPr lang="en-US" smtClean="0"/>
-              <a:t>2/2/25</a:t>
+              <a:t>2/14/25</a:t>
             </a:fld>
             <a:endParaRPr lang="en-US"/>
           </a:p>
@@ -459,7 +465,7 @@
           <a:p>
             <a:fld id="{752DA0A9-DB57-2042-B761-A7985756CD66}" type="datetimeFigureOut">
               <a:rPr lang="en-US" smtClean="0"/>
-              <a:t>2/2/25</a:t>
+              <a:t>2/14/25</a:t>
             </a:fld>
             <a:endParaRPr lang="en-US"/>
           </a:p>
@@ -669,7 +675,7 @@
           <a:p>
             <a:fld id="{752DA0A9-DB57-2042-B761-A7985756CD66}" type="datetimeFigureOut">
               <a:rPr lang="en-US" smtClean="0"/>
-              <a:t>2/2/25</a:t>
+              <a:t>2/14/25</a:t>
             </a:fld>
             <a:endParaRPr lang="en-US"/>
           </a:p>
@@ -869,7 +875,7 @@
           <a:p>
             <a:fld id="{752DA0A9-DB57-2042-B761-A7985756CD66}" type="datetimeFigureOut">
               <a:rPr lang="en-US" smtClean="0"/>
-              <a:t>2/2/25</a:t>
+              <a:t>2/14/25</a:t>
             </a:fld>
             <a:endParaRPr lang="en-US"/>
           </a:p>
@@ -1145,7 +1151,7 @@
           <a:p>
             <a:fld id="{752DA0A9-DB57-2042-B761-A7985756CD66}" type="datetimeFigureOut">
               <a:rPr lang="en-US" smtClean="0"/>
-              <a:t>2/2/25</a:t>
+              <a:t>2/14/25</a:t>
             </a:fld>
             <a:endParaRPr lang="en-US"/>
           </a:p>
@@ -1413,7 +1419,7 @@
           <a:p>
             <a:fld id="{752DA0A9-DB57-2042-B761-A7985756CD66}" type="datetimeFigureOut">
               <a:rPr lang="en-US" smtClean="0"/>
-              <a:t>2/2/25</a:t>
+              <a:t>2/14/25</a:t>
             </a:fld>
             <a:endParaRPr lang="en-US"/>
           </a:p>
@@ -1828,7 +1834,7 @@
           <a:p>
             <a:fld id="{752DA0A9-DB57-2042-B761-A7985756CD66}" type="datetimeFigureOut">
               <a:rPr lang="en-US" smtClean="0"/>
-              <a:t>2/2/25</a:t>
+              <a:t>2/14/25</a:t>
             </a:fld>
             <a:endParaRPr lang="en-US"/>
           </a:p>
@@ -1970,7 +1976,7 @@
           <a:p>
             <a:fld id="{752DA0A9-DB57-2042-B761-A7985756CD66}" type="datetimeFigureOut">
               <a:rPr lang="en-US" smtClean="0"/>
-              <a:t>2/2/25</a:t>
+              <a:t>2/14/25</a:t>
             </a:fld>
             <a:endParaRPr lang="en-US"/>
           </a:p>
@@ -2083,7 +2089,7 @@
           <a:p>
             <a:fld id="{752DA0A9-DB57-2042-B761-A7985756CD66}" type="datetimeFigureOut">
               <a:rPr lang="en-US" smtClean="0"/>
-              <a:t>2/2/25</a:t>
+              <a:t>2/14/25</a:t>
             </a:fld>
             <a:endParaRPr lang="en-US"/>
           </a:p>
@@ -2396,7 +2402,7 @@
           <a:p>
             <a:fld id="{752DA0A9-DB57-2042-B761-A7985756CD66}" type="datetimeFigureOut">
               <a:rPr lang="en-US" smtClean="0"/>
-              <a:t>2/2/25</a:t>
+              <a:t>2/14/25</a:t>
             </a:fld>
             <a:endParaRPr lang="en-US"/>
           </a:p>
@@ -2685,7 +2691,7 @@
           <a:p>
             <a:fld id="{752DA0A9-DB57-2042-B761-A7985756CD66}" type="datetimeFigureOut">
               <a:rPr lang="en-US" smtClean="0"/>
-              <a:t>2/2/25</a:t>
+              <a:t>2/14/25</a:t>
             </a:fld>
             <a:endParaRPr lang="en-US"/>
           </a:p>
@@ -2928,7 +2934,7 @@
           <a:p>
             <a:fld id="{752DA0A9-DB57-2042-B761-A7985756CD66}" type="datetimeFigureOut">
               <a:rPr lang="en-US" smtClean="0"/>
-              <a:t>2/2/25</a:t>
+              <a:t>2/14/25</a:t>
             </a:fld>
             <a:endParaRPr lang="en-US"/>
           </a:p>
@@ -4125,6 +4131,682 @@
         <p:cNvPr id="1" name="">
           <a:extLst>
             <a:ext uri="{FF2B5EF4-FFF2-40B4-BE49-F238E27FC236}">
+              <a16:creationId xmlns:a16="http://schemas.microsoft.com/office/drawing/2014/main" id="{80ACD7BD-2E97-1162-ABB3-CDD22A7A5C5D}"/>
+            </a:ext>
+          </a:extLst>
+        </p:cNvPr>
+        <p:cNvGrpSpPr/>
+        <p:nvPr/>
+      </p:nvGrpSpPr>
+      <p:grpSpPr>
+        <a:xfrm>
+          <a:off x="0" y="0"/>
+          <a:ext cx="0" cy="0"/>
+          <a:chOff x="0" y="0"/>
+          <a:chExt cx="0" cy="0"/>
+        </a:xfrm>
+      </p:grpSpPr>
+      <p:sp>
+        <p:nvSpPr>
+          <p:cNvPr id="54" name="Rounded Rectangle 53">
+            <a:extLst>
+              <a:ext uri="{FF2B5EF4-FFF2-40B4-BE49-F238E27FC236}">
+                <a16:creationId xmlns:a16="http://schemas.microsoft.com/office/drawing/2014/main" id="{3A20B7BB-3857-55F9-072A-9852CDB70087}"/>
+              </a:ext>
+            </a:extLst>
+          </p:cNvPr>
+          <p:cNvSpPr/>
+          <p:nvPr/>
+        </p:nvSpPr>
+        <p:spPr>
+          <a:xfrm>
+            <a:off x="1944411" y="1563553"/>
+            <a:ext cx="2740791" cy="273117"/>
+          </a:xfrm>
+          <a:prstGeom prst="roundRect">
+            <a:avLst/>
+          </a:prstGeom>
+          <a:solidFill>
+            <a:schemeClr val="accent2">
+              <a:lumMod val="40000"/>
+              <a:lumOff val="60000"/>
+            </a:schemeClr>
+          </a:solidFill>
+          <a:ln>
+            <a:solidFill>
+              <a:schemeClr val="accent2">
+                <a:lumMod val="75000"/>
+              </a:schemeClr>
+            </a:solidFill>
+          </a:ln>
+        </p:spPr>
+        <p:style>
+          <a:lnRef idx="2">
+            <a:schemeClr val="accent1">
+              <a:shade val="15000"/>
+            </a:schemeClr>
+          </a:lnRef>
+          <a:fillRef idx="1">
+            <a:schemeClr val="accent1"/>
+          </a:fillRef>
+          <a:effectRef idx="0">
+            <a:schemeClr val="accent1"/>
+          </a:effectRef>
+          <a:fontRef idx="minor">
+            <a:schemeClr val="lt1"/>
+          </a:fontRef>
+        </p:style>
+        <p:txBody>
+          <a:bodyPr rtlCol="0" anchor="ctr"/>
+          <a:lstStyle/>
+          <a:p>
+            <a:pPr algn="ctr"/>
+            <a:endParaRPr lang="en-US"/>
+          </a:p>
+        </p:txBody>
+      </p:sp>
+      <p:sp>
+        <p:nvSpPr>
+          <p:cNvPr id="4" name="Rounded Rectangle 3">
+            <a:extLst>
+              <a:ext uri="{FF2B5EF4-FFF2-40B4-BE49-F238E27FC236}">
+                <a16:creationId xmlns:a16="http://schemas.microsoft.com/office/drawing/2014/main" id="{1E27026D-CB00-0E7E-7473-8CF582937845}"/>
+              </a:ext>
+            </a:extLst>
+          </p:cNvPr>
+          <p:cNvSpPr/>
+          <p:nvPr/>
+        </p:nvSpPr>
+        <p:spPr>
+          <a:xfrm>
+            <a:off x="1671145" y="2785241"/>
+            <a:ext cx="3352800" cy="3602421"/>
+          </a:xfrm>
+          <a:prstGeom prst="roundRect">
+            <a:avLst/>
+          </a:prstGeom>
+          <a:solidFill>
+            <a:schemeClr val="tx2">
+              <a:lumMod val="10000"/>
+              <a:lumOff val="90000"/>
+            </a:schemeClr>
+          </a:solidFill>
+        </p:spPr>
+        <p:style>
+          <a:lnRef idx="2">
+            <a:schemeClr val="accent1">
+              <a:shade val="15000"/>
+            </a:schemeClr>
+          </a:lnRef>
+          <a:fillRef idx="1">
+            <a:schemeClr val="accent1"/>
+          </a:fillRef>
+          <a:effectRef idx="0">
+            <a:schemeClr val="accent1"/>
+          </a:effectRef>
+          <a:fontRef idx="minor">
+            <a:schemeClr val="lt1"/>
+          </a:fontRef>
+        </p:style>
+        <p:txBody>
+          <a:bodyPr rtlCol="0" anchor="ctr"/>
+          <a:lstStyle/>
+          <a:p>
+            <a:pPr algn="ctr"/>
+            <a:endParaRPr lang="en-US"/>
+          </a:p>
+        </p:txBody>
+      </p:sp>
+      <p:sp>
+        <p:nvSpPr>
+          <p:cNvPr id="5" name="Rounded Rectangle 4">
+            <a:extLst>
+              <a:ext uri="{FF2B5EF4-FFF2-40B4-BE49-F238E27FC236}">
+                <a16:creationId xmlns:a16="http://schemas.microsoft.com/office/drawing/2014/main" id="{67060214-7299-6AE7-E7E9-3301E78E5011}"/>
+              </a:ext>
+            </a:extLst>
+          </p:cNvPr>
+          <p:cNvSpPr/>
+          <p:nvPr/>
+        </p:nvSpPr>
+        <p:spPr>
+          <a:xfrm>
+            <a:off x="7556937" y="1733944"/>
+            <a:ext cx="3352800" cy="1005347"/>
+          </a:xfrm>
+          <a:prstGeom prst="roundRect">
+            <a:avLst/>
+          </a:prstGeom>
+          <a:noFill/>
+        </p:spPr>
+        <p:style>
+          <a:lnRef idx="2">
+            <a:schemeClr val="accent1">
+              <a:shade val="15000"/>
+            </a:schemeClr>
+          </a:lnRef>
+          <a:fillRef idx="1">
+            <a:schemeClr val="accent1"/>
+          </a:fillRef>
+          <a:effectRef idx="0">
+            <a:schemeClr val="accent1"/>
+          </a:effectRef>
+          <a:fontRef idx="minor">
+            <a:schemeClr val="lt1"/>
+          </a:fontRef>
+        </p:style>
+        <p:txBody>
+          <a:bodyPr rtlCol="0" anchor="ctr"/>
+          <a:lstStyle/>
+          <a:p>
+            <a:pPr algn="ctr"/>
+            <a:endParaRPr lang="en-US"/>
+          </a:p>
+        </p:txBody>
+      </p:sp>
+      <p:sp>
+        <p:nvSpPr>
+          <p:cNvPr id="6" name="Rounded Rectangle 5">
+            <a:extLst>
+              <a:ext uri="{FF2B5EF4-FFF2-40B4-BE49-F238E27FC236}">
+                <a16:creationId xmlns:a16="http://schemas.microsoft.com/office/drawing/2014/main" id="{3239F1FA-3C69-8CA4-BBC7-6C7A887DF5D9}"/>
+              </a:ext>
+            </a:extLst>
+          </p:cNvPr>
+          <p:cNvSpPr/>
+          <p:nvPr/>
+        </p:nvSpPr>
+        <p:spPr>
+          <a:xfrm>
+            <a:off x="7556937" y="3510460"/>
+            <a:ext cx="3352800" cy="2270230"/>
+          </a:xfrm>
+          <a:prstGeom prst="roundRect">
+            <a:avLst/>
+          </a:prstGeom>
+          <a:noFill/>
+        </p:spPr>
+        <p:style>
+          <a:lnRef idx="2">
+            <a:schemeClr val="accent1">
+              <a:shade val="15000"/>
+            </a:schemeClr>
+          </a:lnRef>
+          <a:fillRef idx="1">
+            <a:schemeClr val="accent1"/>
+          </a:fillRef>
+          <a:effectRef idx="0">
+            <a:schemeClr val="accent1"/>
+          </a:effectRef>
+          <a:fontRef idx="minor">
+            <a:schemeClr val="lt1"/>
+          </a:fontRef>
+        </p:style>
+        <p:txBody>
+          <a:bodyPr rtlCol="0" anchor="ctr"/>
+          <a:lstStyle/>
+          <a:p>
+            <a:pPr algn="ctr"/>
+            <a:endParaRPr lang="en-US"/>
+          </a:p>
+        </p:txBody>
+      </p:sp>
+      <p:pic>
+        <p:nvPicPr>
+          <p:cNvPr id="10" name="Picture 9">
+            <a:extLst>
+              <a:ext uri="{FF2B5EF4-FFF2-40B4-BE49-F238E27FC236}">
+                <a16:creationId xmlns:a16="http://schemas.microsoft.com/office/drawing/2014/main" id="{3751F81C-68A1-4DC1-D05B-31A7FE77582A}"/>
+              </a:ext>
+            </a:extLst>
+          </p:cNvPr>
+          <p:cNvPicPr>
+            <a:picLocks noChangeAspect="1"/>
+          </p:cNvPicPr>
+          <p:nvPr/>
+        </p:nvPicPr>
+        <p:blipFill>
+          <a:blip r:embed="rId2"/>
+          <a:srcRect l="10791" t="9933" b="1"/>
+          <a:stretch/>
+        </p:blipFill>
+        <p:spPr>
+          <a:xfrm>
+            <a:off x="8627487" y="2121217"/>
+            <a:ext cx="1970254" cy="239966"/>
+          </a:xfrm>
+          <a:prstGeom prst="rect">
+            <a:avLst/>
+          </a:prstGeom>
+        </p:spPr>
+      </p:pic>
+      <p:pic>
+        <p:nvPicPr>
+          <p:cNvPr id="22" name="Picture 21" descr="A screenshot of a computer program&#10;&#10;AI-generated content may be incorrect.">
+            <a:extLst>
+              <a:ext uri="{FF2B5EF4-FFF2-40B4-BE49-F238E27FC236}">
+                <a16:creationId xmlns:a16="http://schemas.microsoft.com/office/drawing/2014/main" id="{C2E96D3F-C631-E1C7-8BB6-9B8151E9953B}"/>
+              </a:ext>
+            </a:extLst>
+          </p:cNvPr>
+          <p:cNvPicPr>
+            <a:picLocks noChangeAspect="1"/>
+          </p:cNvPicPr>
+          <p:nvPr/>
+        </p:nvPicPr>
+        <p:blipFill>
+          <a:blip r:embed="rId3"/>
+          <a:stretch>
+            <a:fillRect/>
+          </a:stretch>
+        </p:blipFill>
+        <p:spPr>
+          <a:xfrm>
+            <a:off x="1949888" y="3001140"/>
+            <a:ext cx="2884871" cy="3253153"/>
+          </a:xfrm>
+          <a:prstGeom prst="rect">
+            <a:avLst/>
+          </a:prstGeom>
+        </p:spPr>
+      </p:pic>
+      <p:pic>
+        <p:nvPicPr>
+          <p:cNvPr id="23" name="Picture 22">
+            <a:extLst>
+              <a:ext uri="{FF2B5EF4-FFF2-40B4-BE49-F238E27FC236}">
+                <a16:creationId xmlns:a16="http://schemas.microsoft.com/office/drawing/2014/main" id="{5C39B661-0CFE-E40A-6C47-69CE3855F875}"/>
+              </a:ext>
+            </a:extLst>
+          </p:cNvPr>
+          <p:cNvPicPr>
+            <a:picLocks noChangeAspect="1"/>
+          </p:cNvPicPr>
+          <p:nvPr/>
+        </p:nvPicPr>
+        <p:blipFill>
+          <a:blip r:embed="rId4"/>
+          <a:stretch>
+            <a:fillRect/>
+          </a:stretch>
+        </p:blipFill>
+        <p:spPr>
+          <a:xfrm>
+            <a:off x="2880968" y="1993319"/>
+            <a:ext cx="743018" cy="743018"/>
+          </a:xfrm>
+          <a:prstGeom prst="rect">
+            <a:avLst/>
+          </a:prstGeom>
+        </p:spPr>
+      </p:pic>
+      <p:pic>
+        <p:nvPicPr>
+          <p:cNvPr id="25" name="Picture 24" descr="A black cat in a circle&#10;&#10;AI-generated content may be incorrect.">
+            <a:extLst>
+              <a:ext uri="{FF2B5EF4-FFF2-40B4-BE49-F238E27FC236}">
+                <a16:creationId xmlns:a16="http://schemas.microsoft.com/office/drawing/2014/main" id="{A0BF54CE-E0E5-8DB8-6DD7-3697B8B43462}"/>
+              </a:ext>
+            </a:extLst>
+          </p:cNvPr>
+          <p:cNvPicPr>
+            <a:picLocks noChangeAspect="1"/>
+          </p:cNvPicPr>
+          <p:nvPr/>
+        </p:nvPicPr>
+        <p:blipFill>
+          <a:blip r:embed="rId5"/>
+          <a:stretch>
+            <a:fillRect/>
+          </a:stretch>
+        </p:blipFill>
+        <p:spPr>
+          <a:xfrm>
+            <a:off x="2816352" y="603707"/>
+            <a:ext cx="872249" cy="872249"/>
+          </a:xfrm>
+          <a:prstGeom prst="rect">
+            <a:avLst/>
+          </a:prstGeom>
+        </p:spPr>
+      </p:pic>
+      <p:pic>
+        <p:nvPicPr>
+          <p:cNvPr id="33" name="Picture 32">
+            <a:extLst>
+              <a:ext uri="{FF2B5EF4-FFF2-40B4-BE49-F238E27FC236}">
+                <a16:creationId xmlns:a16="http://schemas.microsoft.com/office/drawing/2014/main" id="{D4F4E3CC-5819-88E6-9181-1F9E69E94309}"/>
+              </a:ext>
+            </a:extLst>
+          </p:cNvPr>
+          <p:cNvPicPr>
+            <a:picLocks noChangeAspect="1"/>
+          </p:cNvPicPr>
+          <p:nvPr/>
+        </p:nvPicPr>
+        <p:blipFill>
+          <a:blip r:embed="rId6"/>
+          <a:stretch>
+            <a:fillRect/>
+          </a:stretch>
+        </p:blipFill>
+        <p:spPr>
+          <a:xfrm>
+            <a:off x="2012949" y="1563553"/>
+            <a:ext cx="2651233" cy="273117"/>
+          </a:xfrm>
+          <a:prstGeom prst="rect">
+            <a:avLst/>
+          </a:prstGeom>
+        </p:spPr>
+      </p:pic>
+      <p:cxnSp>
+        <p:nvCxnSpPr>
+          <p:cNvPr id="35" name="Straight Connector 34">
+            <a:extLst>
+              <a:ext uri="{FF2B5EF4-FFF2-40B4-BE49-F238E27FC236}">
+                <a16:creationId xmlns:a16="http://schemas.microsoft.com/office/drawing/2014/main" id="{266BDAF8-C804-A729-3934-809179067536}"/>
+              </a:ext>
+            </a:extLst>
+          </p:cNvPr>
+          <p:cNvCxnSpPr>
+            <a:cxnSpLocks/>
+          </p:cNvCxnSpPr>
+          <p:nvPr/>
+        </p:nvCxnSpPr>
+        <p:spPr>
+          <a:xfrm flipH="1">
+            <a:off x="2238703" y="1833553"/>
+            <a:ext cx="729208" cy="951688"/>
+          </a:xfrm>
+          <a:prstGeom prst="line">
+            <a:avLst/>
+          </a:prstGeom>
+        </p:spPr>
+        <p:style>
+          <a:lnRef idx="2">
+            <a:schemeClr val="accent1"/>
+          </a:lnRef>
+          <a:fillRef idx="0">
+            <a:schemeClr val="accent1"/>
+          </a:fillRef>
+          <a:effectRef idx="1">
+            <a:schemeClr val="accent1"/>
+          </a:effectRef>
+          <a:fontRef idx="minor">
+            <a:schemeClr val="tx1"/>
+          </a:fontRef>
+        </p:style>
+      </p:cxnSp>
+      <p:cxnSp>
+        <p:nvCxnSpPr>
+          <p:cNvPr id="37" name="Straight Connector 36">
+            <a:extLst>
+              <a:ext uri="{FF2B5EF4-FFF2-40B4-BE49-F238E27FC236}">
+                <a16:creationId xmlns:a16="http://schemas.microsoft.com/office/drawing/2014/main" id="{BB043DAE-CE0A-DA56-3D56-378930C14FC0}"/>
+              </a:ext>
+            </a:extLst>
+          </p:cNvPr>
+          <p:cNvCxnSpPr>
+            <a:cxnSpLocks/>
+          </p:cNvCxnSpPr>
+          <p:nvPr/>
+        </p:nvCxnSpPr>
+        <p:spPr>
+          <a:xfrm>
+            <a:off x="3535469" y="1833553"/>
+            <a:ext cx="710710" cy="951688"/>
+          </a:xfrm>
+          <a:prstGeom prst="line">
+            <a:avLst/>
+          </a:prstGeom>
+        </p:spPr>
+        <p:style>
+          <a:lnRef idx="2">
+            <a:schemeClr val="accent1"/>
+          </a:lnRef>
+          <a:fillRef idx="0">
+            <a:schemeClr val="accent1"/>
+          </a:fillRef>
+          <a:effectRef idx="1">
+            <a:schemeClr val="accent1"/>
+          </a:effectRef>
+          <a:fontRef idx="minor">
+            <a:schemeClr val="tx1"/>
+          </a:fontRef>
+        </p:style>
+      </p:cxnSp>
+      <p:pic>
+        <p:nvPicPr>
+          <p:cNvPr id="40" name="Picture 39">
+            <a:extLst>
+              <a:ext uri="{FF2B5EF4-FFF2-40B4-BE49-F238E27FC236}">
+                <a16:creationId xmlns:a16="http://schemas.microsoft.com/office/drawing/2014/main" id="{D35AFA56-01A2-F919-32B1-5F81B7D75731}"/>
+              </a:ext>
+            </a:extLst>
+          </p:cNvPr>
+          <p:cNvPicPr>
+            <a:picLocks noChangeAspect="1"/>
+          </p:cNvPicPr>
+          <p:nvPr/>
+        </p:nvPicPr>
+        <p:blipFill>
+          <a:blip r:embed="rId7"/>
+          <a:stretch>
+            <a:fillRect/>
+          </a:stretch>
+        </p:blipFill>
+        <p:spPr>
+          <a:xfrm>
+            <a:off x="5715852" y="1631539"/>
+            <a:ext cx="1310913" cy="1310913"/>
+          </a:xfrm>
+          <a:prstGeom prst="rect">
+            <a:avLst/>
+          </a:prstGeom>
+        </p:spPr>
+      </p:pic>
+      <p:pic>
+        <p:nvPicPr>
+          <p:cNvPr id="41" name="Picture 40">
+            <a:extLst>
+              <a:ext uri="{FF2B5EF4-FFF2-40B4-BE49-F238E27FC236}">
+                <a16:creationId xmlns:a16="http://schemas.microsoft.com/office/drawing/2014/main" id="{019297AF-4A79-BDAD-4B2A-F6CF8624B0D8}"/>
+              </a:ext>
+            </a:extLst>
+          </p:cNvPr>
+          <p:cNvPicPr>
+            <a:picLocks noChangeAspect="1"/>
+          </p:cNvPicPr>
+          <p:nvPr/>
+        </p:nvPicPr>
+        <p:blipFill>
+          <a:blip r:embed="rId8"/>
+          <a:stretch>
+            <a:fillRect/>
+          </a:stretch>
+        </p:blipFill>
+        <p:spPr>
+          <a:xfrm>
+            <a:off x="5819789" y="4314940"/>
+            <a:ext cx="1097892" cy="1097892"/>
+          </a:xfrm>
+          <a:prstGeom prst="rect">
+            <a:avLst/>
+          </a:prstGeom>
+        </p:spPr>
+      </p:pic>
+      <p:pic>
+        <p:nvPicPr>
+          <p:cNvPr id="42" name="Picture 41">
+            <a:extLst>
+              <a:ext uri="{FF2B5EF4-FFF2-40B4-BE49-F238E27FC236}">
+                <a16:creationId xmlns:a16="http://schemas.microsoft.com/office/drawing/2014/main" id="{0D83109D-FC4A-DEC1-741B-D05CF64F069D}"/>
+              </a:ext>
+            </a:extLst>
+          </p:cNvPr>
+          <p:cNvPicPr>
+            <a:picLocks noChangeAspect="1"/>
+          </p:cNvPicPr>
+          <p:nvPr/>
+        </p:nvPicPr>
+        <p:blipFill>
+          <a:blip r:embed="rId9"/>
+          <a:stretch>
+            <a:fillRect/>
+          </a:stretch>
+        </p:blipFill>
+        <p:spPr>
+          <a:xfrm>
+            <a:off x="7828555" y="1950667"/>
+            <a:ext cx="602880" cy="602880"/>
+          </a:xfrm>
+          <a:prstGeom prst="rect">
+            <a:avLst/>
+          </a:prstGeom>
+        </p:spPr>
+      </p:pic>
+      <p:pic>
+        <p:nvPicPr>
+          <p:cNvPr id="52" name="Picture 51">
+            <a:extLst>
+              <a:ext uri="{FF2B5EF4-FFF2-40B4-BE49-F238E27FC236}">
+                <a16:creationId xmlns:a16="http://schemas.microsoft.com/office/drawing/2014/main" id="{C3D6D6CB-E5A7-0739-3536-D7B490C92074}"/>
+              </a:ext>
+            </a:extLst>
+          </p:cNvPr>
+          <p:cNvPicPr>
+            <a:picLocks noChangeAspect="1"/>
+          </p:cNvPicPr>
+          <p:nvPr/>
+        </p:nvPicPr>
+        <p:blipFill>
+          <a:blip r:embed="rId10"/>
+          <a:stretch>
+            <a:fillRect/>
+          </a:stretch>
+        </p:blipFill>
+        <p:spPr>
+          <a:xfrm>
+            <a:off x="8627487" y="3754238"/>
+            <a:ext cx="527390" cy="527390"/>
+          </a:xfrm>
+          <a:prstGeom prst="rect">
+            <a:avLst/>
+          </a:prstGeom>
+        </p:spPr>
+      </p:pic>
+      <p:pic>
+        <p:nvPicPr>
+          <p:cNvPr id="53" name="Picture 52">
+            <a:extLst>
+              <a:ext uri="{FF2B5EF4-FFF2-40B4-BE49-F238E27FC236}">
+                <a16:creationId xmlns:a16="http://schemas.microsoft.com/office/drawing/2014/main" id="{CCE2820A-4515-E2DE-0878-333ACE779DE3}"/>
+              </a:ext>
+            </a:extLst>
+          </p:cNvPr>
+          <p:cNvPicPr>
+            <a:picLocks noChangeAspect="1"/>
+          </p:cNvPicPr>
+          <p:nvPr/>
+        </p:nvPicPr>
+        <p:blipFill>
+          <a:blip r:embed="rId11"/>
+          <a:stretch>
+            <a:fillRect/>
+          </a:stretch>
+        </p:blipFill>
+        <p:spPr>
+          <a:xfrm>
+            <a:off x="9364493" y="3707029"/>
+            <a:ext cx="559489" cy="559489"/>
+          </a:xfrm>
+          <a:prstGeom prst="rect">
+            <a:avLst/>
+          </a:prstGeom>
+        </p:spPr>
+      </p:pic>
+      <p:pic>
+        <p:nvPicPr>
+          <p:cNvPr id="59" name="Picture 58">
+            <a:extLst>
+              <a:ext uri="{FF2B5EF4-FFF2-40B4-BE49-F238E27FC236}">
+                <a16:creationId xmlns:a16="http://schemas.microsoft.com/office/drawing/2014/main" id="{34D0CC54-87F3-E538-94D3-8701494C95D2}"/>
+              </a:ext>
+            </a:extLst>
+          </p:cNvPr>
+          <p:cNvPicPr>
+            <a:picLocks noChangeAspect="1"/>
+          </p:cNvPicPr>
+          <p:nvPr/>
+        </p:nvPicPr>
+        <p:blipFill>
+          <a:blip r:embed="rId12"/>
+          <a:stretch>
+            <a:fillRect/>
+          </a:stretch>
+        </p:blipFill>
+        <p:spPr>
+          <a:xfrm>
+            <a:off x="7767339" y="4484971"/>
+            <a:ext cx="2934436" cy="241487"/>
+          </a:xfrm>
+          <a:prstGeom prst="rect">
+            <a:avLst/>
+          </a:prstGeom>
+        </p:spPr>
+      </p:pic>
+      <p:pic>
+        <p:nvPicPr>
+          <p:cNvPr id="63" name="Picture 62" descr="A black background with blue text&#10;&#10;AI-generated content may be incorrect.">
+            <a:extLst>
+              <a:ext uri="{FF2B5EF4-FFF2-40B4-BE49-F238E27FC236}">
+                <a16:creationId xmlns:a16="http://schemas.microsoft.com/office/drawing/2014/main" id="{CF44236A-61A3-BDE9-030D-298C171CD707}"/>
+              </a:ext>
+            </a:extLst>
+          </p:cNvPr>
+          <p:cNvPicPr>
+            <a:picLocks noChangeAspect="1"/>
+          </p:cNvPicPr>
+          <p:nvPr/>
+        </p:nvPicPr>
+        <p:blipFill>
+          <a:blip r:embed="rId13"/>
+          <a:stretch>
+            <a:fillRect/>
+          </a:stretch>
+        </p:blipFill>
+        <p:spPr>
+          <a:xfrm>
+            <a:off x="8129995" y="4905932"/>
+            <a:ext cx="2206684" cy="643366"/>
+          </a:xfrm>
+          <a:prstGeom prst="rect">
+            <a:avLst/>
+          </a:prstGeom>
+        </p:spPr>
+      </p:pic>
+    </p:spTree>
+    <p:extLst>
+      <p:ext uri="{BB962C8B-B14F-4D97-AF65-F5344CB8AC3E}">
+        <p14:creationId xmlns:p14="http://schemas.microsoft.com/office/powerpoint/2010/main" val="2863663689"/>
+      </p:ext>
+    </p:extLst>
+  </p:cSld>
+  <p:clrMapOvr>
+    <a:masterClrMapping/>
+  </p:clrMapOvr>
+</p:sld>
+</file>
+
+<file path=ppt/slides/slide3.xml><?xml version="1.0" encoding="utf-8"?>
+<p:sld xmlns:a="http://schemas.openxmlformats.org/drawingml/2006/main" xmlns:r="http://schemas.openxmlformats.org/officeDocument/2006/relationships" xmlns:p="http://schemas.openxmlformats.org/presentationml/2006/main">
+  <p:cSld>
+    <p:spTree>
+      <p:nvGrpSpPr>
+        <p:cNvPr id="1" name="">
+          <a:extLst>
+            <a:ext uri="{FF2B5EF4-FFF2-40B4-BE49-F238E27FC236}">
               <a16:creationId xmlns:a16="http://schemas.microsoft.com/office/drawing/2014/main" id="{721DE37B-CA25-8560-2677-B531230948A3}"/>
             </a:ext>
           </a:extLst>
@@ -4793,7 +5475,7 @@
 </p:sld>
 </file>
 
-<file path=ppt/slides/slide3.xml><?xml version="1.0" encoding="utf-8"?>
+<file path=ppt/slides/slide4.xml><?xml version="1.0" encoding="utf-8"?>
 <p:sld xmlns:a="http://schemas.openxmlformats.org/drawingml/2006/main" xmlns:r="http://schemas.openxmlformats.org/officeDocument/2006/relationships" xmlns:p="http://schemas.openxmlformats.org/presentationml/2006/main">
   <p:cSld>
     <p:spTree>
@@ -5679,7 +6361,7 @@
 </p:sld>
 </file>
 
-<file path=ppt/slides/slide4.xml><?xml version="1.0" encoding="utf-8"?>
+<file path=ppt/slides/slide5.xml><?xml version="1.0" encoding="utf-8"?>
 <p:sld xmlns:a="http://schemas.openxmlformats.org/drawingml/2006/main" xmlns:r="http://schemas.openxmlformats.org/officeDocument/2006/relationships" xmlns:p="http://schemas.openxmlformats.org/presentationml/2006/main">
   <p:cSld>
     <p:spTree>

</xml_diff>